<commit_message>
Update Oral defence 07-01-2021.pptx
</commit_message>
<xml_diff>
--- a/Presentations/Oral defence 07-01-2021.pptx
+++ b/Presentations/Oral defence 07-01-2021.pptx
@@ -197,7 +197,7 @@
 <file path=ppt/revisionInfo.xml><?xml version="1.0" encoding="utf-8"?>
 <p1510:revInfo xmlns:a="http://schemas.openxmlformats.org/drawingml/2006/main" xmlns:r="http://schemas.openxmlformats.org/officeDocument/2006/relationships" xmlns:p1510="http://schemas.microsoft.com/office/powerpoint/2015/10/main">
   <p1510:revLst>
-    <p1510:client id="{977C598A-4D9E-41F6-86F7-5D81D4506CA8}" v="610" dt="2021-01-05T10:40:02.683"/>
+    <p1510:client id="{977C598A-4D9E-41F6-86F7-5D81D4506CA8}" v="612" dt="2021-01-06T14:08:32.002"/>
   </p1510:revLst>
 </p1510:revInfo>
 </file>
@@ -207,7 +207,7 @@
   <pc:docChgLst>
     <pc:chgData name="benjamin Skjold" userId="c95198f139ad621b" providerId="LiveId" clId="{977C598A-4D9E-41F6-86F7-5D81D4506CA8}"/>
     <pc:docChg chg="undo custSel addSld delSld modSld sldOrd">
-      <pc:chgData name="benjamin Skjold" userId="c95198f139ad621b" providerId="LiveId" clId="{977C598A-4D9E-41F6-86F7-5D81D4506CA8}" dt="2021-01-05T10:40:43.172" v="2951" actId="1036"/>
+      <pc:chgData name="benjamin Skjold" userId="c95198f139ad621b" providerId="LiveId" clId="{977C598A-4D9E-41F6-86F7-5D81D4506CA8}" dt="2021-01-06T14:08:32.002" v="2954" actId="207"/>
       <pc:docMkLst>
         <pc:docMk/>
       </pc:docMkLst>
@@ -1252,7 +1252,7 @@
         </pc:cxnChg>
       </pc:sldChg>
       <pc:sldChg chg="delSp modSp add modAnim">
-        <pc:chgData name="benjamin Skjold" userId="c95198f139ad621b" providerId="LiveId" clId="{977C598A-4D9E-41F6-86F7-5D81D4506CA8}" dt="2021-01-05T08:33:11.540" v="1551"/>
+        <pc:chgData name="benjamin Skjold" userId="c95198f139ad621b" providerId="LiveId" clId="{977C598A-4D9E-41F6-86F7-5D81D4506CA8}" dt="2021-01-06T14:08:32.002" v="2954" actId="207"/>
         <pc:sldMkLst>
           <pc:docMk/>
           <pc:sldMk cId="1828641243" sldId="276"/>
@@ -1274,7 +1274,7 @@
           </ac:spMkLst>
         </pc:spChg>
         <pc:spChg chg="mod">
-          <ac:chgData name="benjamin Skjold" userId="c95198f139ad621b" providerId="LiveId" clId="{977C598A-4D9E-41F6-86F7-5D81D4506CA8}" dt="2021-01-05T08:29:27.159" v="1539" actId="1076"/>
+          <ac:chgData name="benjamin Skjold" userId="c95198f139ad621b" providerId="LiveId" clId="{977C598A-4D9E-41F6-86F7-5D81D4506CA8}" dt="2021-01-06T14:08:32.002" v="2954" actId="207"/>
           <ac:spMkLst>
             <pc:docMk/>
             <pc:sldMk cId="1828641243" sldId="276"/>
@@ -10879,8 +10879,8 @@
           </a:p>
         </p:txBody>
       </p:sp>
-      <mc:AlternateContent xmlns:mc="http://schemas.openxmlformats.org/markup-compatibility/2006">
-        <mc:Choice xmlns:a14="http://schemas.microsoft.com/office/drawing/2010/main" Requires="a14">
+      <mc:AlternateContent xmlns:mc="http://schemas.openxmlformats.org/markup-compatibility/2006" xmlns:a14="http://schemas.microsoft.com/office/drawing/2010/main">
+        <mc:Choice Requires="a14">
           <p:sp>
             <p:nvSpPr>
               <p:cNvPr id="7" name="Tekstfelt 6">
@@ -11055,7 +11055,7 @@
             </p:txBody>
           </p:sp>
         </mc:Choice>
-        <mc:Fallback>
+        <mc:Fallback xmlns="">
           <p:sp>
             <p:nvSpPr>
               <p:cNvPr id="7" name="Tekstfelt 6">
@@ -11350,8 +11350,8 @@
           </a:p>
         </p:txBody>
       </p:sp>
-      <mc:AlternateContent xmlns:mc="http://schemas.openxmlformats.org/markup-compatibility/2006">
-        <mc:Choice xmlns:a14="http://schemas.microsoft.com/office/drawing/2010/main" Requires="a14">
+      <mc:AlternateContent xmlns:mc="http://schemas.openxmlformats.org/markup-compatibility/2006" xmlns:a14="http://schemas.microsoft.com/office/drawing/2010/main">
+        <mc:Choice Requires="a14">
           <p:sp>
             <p:nvSpPr>
               <p:cNvPr id="25" name="Tekstfelt 24">
@@ -11591,7 +11591,7 @@
             </p:txBody>
           </p:sp>
         </mc:Choice>
-        <mc:Fallback>
+        <mc:Fallback xmlns="">
           <p:sp>
             <p:nvSpPr>
               <p:cNvPr id="25" name="Tekstfelt 24">
@@ -11636,8 +11636,8 @@
           </p:sp>
         </mc:Fallback>
       </mc:AlternateContent>
-      <mc:AlternateContent xmlns:mc="http://schemas.openxmlformats.org/markup-compatibility/2006">
-        <mc:Choice xmlns:a14="http://schemas.microsoft.com/office/drawing/2010/main" Requires="a14">
+      <mc:AlternateContent xmlns:mc="http://schemas.openxmlformats.org/markup-compatibility/2006" xmlns:a14="http://schemas.microsoft.com/office/drawing/2010/main">
+        <mc:Choice Requires="a14">
           <p:sp>
             <p:nvSpPr>
               <p:cNvPr id="26" name="Tekstfelt 25">
@@ -11842,7 +11842,7 @@
             </p:txBody>
           </p:sp>
         </mc:Choice>
-        <mc:Fallback>
+        <mc:Fallback xmlns="">
           <p:sp>
             <p:nvSpPr>
               <p:cNvPr id="26" name="Tekstfelt 25">
@@ -12293,8 +12293,8 @@
           </a:p>
         </p:txBody>
       </p:sp>
-      <mc:AlternateContent xmlns:mc="http://schemas.openxmlformats.org/markup-compatibility/2006">
-        <mc:Choice xmlns:a14="http://schemas.microsoft.com/office/drawing/2010/main" Requires="a14">
+      <mc:AlternateContent xmlns:mc="http://schemas.openxmlformats.org/markup-compatibility/2006" xmlns:a14="http://schemas.microsoft.com/office/drawing/2010/main">
+        <mc:Choice Requires="a14">
           <p:sp>
             <p:nvSpPr>
               <p:cNvPr id="7" name="Tekstfelt 6">
@@ -12469,7 +12469,7 @@
             </p:txBody>
           </p:sp>
         </mc:Choice>
-        <mc:Fallback>
+        <mc:Fallback xmlns="">
           <p:sp>
             <p:nvSpPr>
               <p:cNvPr id="7" name="Tekstfelt 6">
@@ -12675,8 +12675,8 @@
           </a:p>
         </p:txBody>
       </p:sp>
-      <mc:AlternateContent xmlns:mc="http://schemas.openxmlformats.org/markup-compatibility/2006">
-        <mc:Choice xmlns:a14="http://schemas.microsoft.com/office/drawing/2010/main" Requires="a14">
+      <mc:AlternateContent xmlns:mc="http://schemas.openxmlformats.org/markup-compatibility/2006" xmlns:a14="http://schemas.microsoft.com/office/drawing/2010/main">
+        <mc:Choice Requires="a14">
           <p:sp>
             <p:nvSpPr>
               <p:cNvPr id="26" name="Tekstfelt 25">
@@ -12881,7 +12881,7 @@
             </p:txBody>
           </p:sp>
         </mc:Choice>
-        <mc:Fallback>
+        <mc:Fallback xmlns="">
           <p:sp>
             <p:nvSpPr>
               <p:cNvPr id="26" name="Tekstfelt 25">
@@ -13589,11 +13589,14 @@
             </a:r>
             <a:r>
               <a:rPr lang="en-US" dirty="0">
+                <a:solidFill>
+                  <a:schemeClr val="bg1"/>
+                </a:solidFill>
                 <a:highlight>
                   <a:srgbClr val="0000FF"/>
                 </a:highlight>
               </a:rPr>
-              <a:t>decision maker </a:t>
+              <a:t>decision maker</a:t>
             </a:r>
             <a:r>
               <a:rPr lang="en-US" dirty="0"/>
@@ -13601,6 +13604,9 @@
             </a:r>
             <a:r>
               <a:rPr lang="en-US" dirty="0">
+                <a:solidFill>
+                  <a:schemeClr val="bg1"/>
+                </a:solidFill>
                 <a:highlight>
                   <a:srgbClr val="FF0000"/>
                 </a:highlight>
@@ -14210,8 +14216,8 @@
           </a:p>
         </p:txBody>
       </p:sp>
-      <mc:AlternateContent xmlns:mc="http://schemas.openxmlformats.org/markup-compatibility/2006">
-        <mc:Choice xmlns:a14="http://schemas.microsoft.com/office/drawing/2010/main" Requires="a14">
+      <mc:AlternateContent xmlns:mc="http://schemas.openxmlformats.org/markup-compatibility/2006" xmlns:a14="http://schemas.microsoft.com/office/drawing/2010/main">
+        <mc:Choice Requires="a14">
           <p:sp>
             <p:nvSpPr>
               <p:cNvPr id="11" name="Tekstfelt 10">
@@ -14512,7 +14518,7 @@
             </p:txBody>
           </p:sp>
         </mc:Choice>
-        <mc:Fallback>
+        <mc:Fallback xmlns="">
           <p:sp>
             <p:nvSpPr>
               <p:cNvPr id="11" name="Tekstfelt 10">
@@ -14557,8 +14563,8 @@
           </p:sp>
         </mc:Fallback>
       </mc:AlternateContent>
-      <mc:AlternateContent xmlns:mc="http://schemas.openxmlformats.org/markup-compatibility/2006">
-        <mc:Choice xmlns:a14="http://schemas.microsoft.com/office/drawing/2010/main" Requires="a14">
+      <mc:AlternateContent xmlns:mc="http://schemas.openxmlformats.org/markup-compatibility/2006" xmlns:a14="http://schemas.microsoft.com/office/drawing/2010/main">
+        <mc:Choice Requires="a14">
           <p:sp>
             <p:nvSpPr>
               <p:cNvPr id="12" name="Rektangel 11">
@@ -14586,6 +14592,7 @@
               </a:bodyPr>
               <a:lstStyle/>
               <a:p>
+                <a:pPr/>
                 <a14:m>
                   <m:oMathPara xmlns:m="http://schemas.openxmlformats.org/officeDocument/2006/math">
                     <m:oMathParaPr>
@@ -14835,7 +14842,7 @@
             </p:txBody>
           </p:sp>
         </mc:Choice>
-        <mc:Fallback>
+        <mc:Fallback xmlns="">
           <p:sp>
             <p:nvSpPr>
               <p:cNvPr id="12" name="Rektangel 11">
@@ -15230,8 +15237,8 @@
           </a:p>
         </p:txBody>
       </p:sp>
-      <mc:AlternateContent xmlns:mc="http://schemas.openxmlformats.org/markup-compatibility/2006">
-        <mc:Choice xmlns:a14="http://schemas.microsoft.com/office/drawing/2010/main" Requires="a14">
+      <mc:AlternateContent xmlns:mc="http://schemas.openxmlformats.org/markup-compatibility/2006" xmlns:a14="http://schemas.microsoft.com/office/drawing/2010/main">
+        <mc:Choice Requires="a14">
           <p:sp>
             <p:nvSpPr>
               <p:cNvPr id="11" name="Tekstfelt 10">
@@ -15532,7 +15539,7 @@
             </p:txBody>
           </p:sp>
         </mc:Choice>
-        <mc:Fallback>
+        <mc:Fallback xmlns="">
           <p:sp>
             <p:nvSpPr>
               <p:cNvPr id="11" name="Tekstfelt 10">
@@ -15577,8 +15584,8 @@
           </p:sp>
         </mc:Fallback>
       </mc:AlternateContent>
-      <mc:AlternateContent xmlns:mc="http://schemas.openxmlformats.org/markup-compatibility/2006">
-        <mc:Choice xmlns:a14="http://schemas.microsoft.com/office/drawing/2010/main" Requires="a14">
+      <mc:AlternateContent xmlns:mc="http://schemas.openxmlformats.org/markup-compatibility/2006" xmlns:a14="http://schemas.microsoft.com/office/drawing/2010/main">
+        <mc:Choice Requires="a14">
           <p:sp>
             <p:nvSpPr>
               <p:cNvPr id="12" name="Rektangel 11">
@@ -15606,6 +15613,7 @@
               </a:bodyPr>
               <a:lstStyle/>
               <a:p>
+                <a:pPr/>
                 <a14:m>
                   <m:oMathPara xmlns:m="http://schemas.openxmlformats.org/officeDocument/2006/math">
                     <m:oMathParaPr>
@@ -15855,7 +15863,7 @@
             </p:txBody>
           </p:sp>
         </mc:Choice>
-        <mc:Fallback>
+        <mc:Fallback xmlns="">
           <p:sp>
             <p:nvSpPr>
               <p:cNvPr id="12" name="Rektangel 11">
@@ -28784,11 +28792,11 @@
 </file>
 
 <file path=customXml/item1.xml><?xml version="1.0" encoding="utf-8"?>
-<TemplafyFormConfiguration><![CDATA[{"formFields":[{"required":false,"helpTexts":{"prefix":"","postfix":""},"spacing":{},"type":"datePicker","name":"Date","label":"Date","fullyQualifiedName":"Date"},{"required":false,"placeholder":"","lines":0,"helpTexts":{"prefix":"","postfix":""},"spacing":{},"type":"textBox","name":"PresentationTitle","label":"Presentation title","fullyQualifiedName":"PresentationTitle"}],"formDataEntries":[{"name":"Date","value":"gYYY5p0AW6ZZz+5WJ6voPQ=="}]}]]></TemplafyFormConfiguration>
+<TemplafyTemplateConfiguration><![CDATA[{"elementsMetadata":[{"type":"shape","id":"f70daa97-d2a7-4f27-b3e4-3e0805dc6446","elementConfiguration":{"binding":"UserProfile.Offices.Workarea_{{DocumentLanguage}}","disableUpdates":false,"type":"text"}},{"type":"shape","id":"5afc5965-8474-4143-8eab-b124e0a01f3d","elementConfiguration":{"format":"{{DateFormats.GeneralDate}}","binding":"Form.Date","disableUpdates":false,"type":"date"}},{"type":"shape","id":"28e5adc8-12e5-44ea-9f55-d58f014d1558","elementConfiguration":{"binding":"Form.PresentationTitle","disableUpdates":false,"type":"text"}}],"transformationConfigurations":[{"language":"{{DocumentLanguage}}","disableUpdates":false,"type":"proofingLanguage"}],"templateName":"DTU Template 16_9 - Corporate red","templateDescription":"","enableDocumentContentUpdater":true,"version":"1.2"}]]></TemplafyTemplateConfiguration>
 </file>
 
 <file path=customXml/item2.xml><?xml version="1.0" encoding="utf-8"?>
-<TemplafyTemplateConfiguration><![CDATA[{"elementsMetadata":[{"type":"shape","id":"f70daa97-d2a7-4f27-b3e4-3e0805dc6446","elementConfiguration":{"binding":"UserProfile.Offices.Workarea_{{DocumentLanguage}}","disableUpdates":false,"type":"text"}},{"type":"shape","id":"5afc5965-8474-4143-8eab-b124e0a01f3d","elementConfiguration":{"format":"{{DateFormats.GeneralDate}}","binding":"Form.Date","disableUpdates":false,"type":"date"}},{"type":"shape","id":"28e5adc8-12e5-44ea-9f55-d58f014d1558","elementConfiguration":{"binding":"Form.PresentationTitle","disableUpdates":false,"type":"text"}}],"transformationConfigurations":[{"language":"{{DocumentLanguage}}","disableUpdates":false,"type":"proofingLanguage"}],"templateName":"DTU Template 16_9 - Corporate red","templateDescription":"","enableDocumentContentUpdater":true,"version":"1.2"}]]></TemplafyTemplateConfiguration>
+<TemplafyFormConfiguration><![CDATA[{"formFields":[{"required":false,"helpTexts":{"prefix":"","postfix":""},"spacing":{},"type":"datePicker","name":"Date","label":"Date","fullyQualifiedName":"Date"},{"required":false,"placeholder":"","lines":0,"helpTexts":{"prefix":"","postfix":""},"spacing":{},"type":"textBox","name":"PresentationTitle","label":"Presentation title","fullyQualifiedName":"PresentationTitle"}],"formDataEntries":[{"name":"Date","value":"gYYY5p0AW6ZZz+5WJ6voPQ=="}]}]]></TemplafyFormConfiguration>
 </file>
 
 <file path=customXml/item3.xml><?xml version="1.0" encoding="utf-8"?>
@@ -28816,13 +28824,13 @@
 </file>
 
 <file path=customXml/itemProps1.xml><?xml version="1.0" encoding="utf-8"?>
-<ds:datastoreItem xmlns:ds="http://schemas.openxmlformats.org/officeDocument/2006/customXml" ds:itemID="{43763224-B85A-4B53-A86A-261D26A71C30}">
+<ds:datastoreItem xmlns:ds="http://schemas.openxmlformats.org/officeDocument/2006/customXml" ds:itemID="{1334258C-C3E7-4029-A615-C886A240FB15}">
   <ds:schemaRefs/>
 </ds:datastoreItem>
 </file>
 
 <file path=customXml/itemProps2.xml><?xml version="1.0" encoding="utf-8"?>
-<ds:datastoreItem xmlns:ds="http://schemas.openxmlformats.org/officeDocument/2006/customXml" ds:itemID="{1334258C-C3E7-4029-A615-C886A240FB15}">
+<ds:datastoreItem xmlns:ds="http://schemas.openxmlformats.org/officeDocument/2006/customXml" ds:itemID="{43763224-B85A-4B53-A86A-261D26A71C30}">
   <ds:schemaRefs/>
 </ds:datastoreItem>
 </file>

</xml_diff>